<commit_message>
updated ppt-3 and mlm.ipynb
</commit_message>
<xml_diff>
--- a/GenAI-3.pptx
+++ b/GenAI-3.pptx
@@ -130,6 +130,11 @@
       </a:defRPr>
     </a:lvl9pPr>
   </p:defaultTextStyle>
+  <p:extLst>
+    <p:ext uri="{EFAFB233-063F-42B5-8137-9DF3F51BA10A}">
+      <p15:sldGuideLst xmlns:p15="http://schemas.microsoft.com/office/powerpoint/2012/main"/>
+    </p:ext>
+  </p:extLst>
 </p:presentation>
 </file>
 
@@ -282,7 +287,7 @@
           <a:p>
             <a:fld id="{A8DD45EA-5B88-4702-A20F-312B77BE3CF6}" type="datetimeFigureOut">
               <a:rPr lang="en-IN" smtClean="0"/>
-              <a:t>19-09-2024</a:t>
+              <a:t>20-09-2024</a:t>
             </a:fld>
             <a:endParaRPr lang="en-IN"/>
           </a:p>
@@ -482,7 +487,7 @@
           <a:p>
             <a:fld id="{A8DD45EA-5B88-4702-A20F-312B77BE3CF6}" type="datetimeFigureOut">
               <a:rPr lang="en-IN" smtClean="0"/>
-              <a:t>19-09-2024</a:t>
+              <a:t>20-09-2024</a:t>
             </a:fld>
             <a:endParaRPr lang="en-IN"/>
           </a:p>
@@ -692,7 +697,7 @@
           <a:p>
             <a:fld id="{A8DD45EA-5B88-4702-A20F-312B77BE3CF6}" type="datetimeFigureOut">
               <a:rPr lang="en-IN" smtClean="0"/>
-              <a:t>19-09-2024</a:t>
+              <a:t>20-09-2024</a:t>
             </a:fld>
             <a:endParaRPr lang="en-IN"/>
           </a:p>
@@ -892,7 +897,7 @@
           <a:p>
             <a:fld id="{A8DD45EA-5B88-4702-A20F-312B77BE3CF6}" type="datetimeFigureOut">
               <a:rPr lang="en-IN" smtClean="0"/>
-              <a:t>19-09-2024</a:t>
+              <a:t>20-09-2024</a:t>
             </a:fld>
             <a:endParaRPr lang="en-IN"/>
           </a:p>
@@ -1168,7 +1173,7 @@
           <a:p>
             <a:fld id="{A8DD45EA-5B88-4702-A20F-312B77BE3CF6}" type="datetimeFigureOut">
               <a:rPr lang="en-IN" smtClean="0"/>
-              <a:t>19-09-2024</a:t>
+              <a:t>20-09-2024</a:t>
             </a:fld>
             <a:endParaRPr lang="en-IN"/>
           </a:p>
@@ -1436,7 +1441,7 @@
           <a:p>
             <a:fld id="{A8DD45EA-5B88-4702-A20F-312B77BE3CF6}" type="datetimeFigureOut">
               <a:rPr lang="en-IN" smtClean="0"/>
-              <a:t>19-09-2024</a:t>
+              <a:t>20-09-2024</a:t>
             </a:fld>
             <a:endParaRPr lang="en-IN"/>
           </a:p>
@@ -1851,7 +1856,7 @@
           <a:p>
             <a:fld id="{A8DD45EA-5B88-4702-A20F-312B77BE3CF6}" type="datetimeFigureOut">
               <a:rPr lang="en-IN" smtClean="0"/>
-              <a:t>19-09-2024</a:t>
+              <a:t>20-09-2024</a:t>
             </a:fld>
             <a:endParaRPr lang="en-IN"/>
           </a:p>
@@ -1993,7 +1998,7 @@
           <a:p>
             <a:fld id="{A8DD45EA-5B88-4702-A20F-312B77BE3CF6}" type="datetimeFigureOut">
               <a:rPr lang="en-IN" smtClean="0"/>
-              <a:t>19-09-2024</a:t>
+              <a:t>20-09-2024</a:t>
             </a:fld>
             <a:endParaRPr lang="en-IN"/>
           </a:p>
@@ -2106,7 +2111,7 @@
           <a:p>
             <a:fld id="{A8DD45EA-5B88-4702-A20F-312B77BE3CF6}" type="datetimeFigureOut">
               <a:rPr lang="en-IN" smtClean="0"/>
-              <a:t>19-09-2024</a:t>
+              <a:t>20-09-2024</a:t>
             </a:fld>
             <a:endParaRPr lang="en-IN"/>
           </a:p>
@@ -2419,7 +2424,7 @@
           <a:p>
             <a:fld id="{A8DD45EA-5B88-4702-A20F-312B77BE3CF6}" type="datetimeFigureOut">
               <a:rPr lang="en-IN" smtClean="0"/>
-              <a:t>19-09-2024</a:t>
+              <a:t>20-09-2024</a:t>
             </a:fld>
             <a:endParaRPr lang="en-IN"/>
           </a:p>
@@ -2708,7 +2713,7 @@
           <a:p>
             <a:fld id="{A8DD45EA-5B88-4702-A20F-312B77BE3CF6}" type="datetimeFigureOut">
               <a:rPr lang="en-IN" smtClean="0"/>
-              <a:t>19-09-2024</a:t>
+              <a:t>20-09-2024</a:t>
             </a:fld>
             <a:endParaRPr lang="en-IN"/>
           </a:p>
@@ -2951,7 +2956,7 @@
           <a:p>
             <a:fld id="{A8DD45EA-5B88-4702-A20F-312B77BE3CF6}" type="datetimeFigureOut">
               <a:rPr lang="en-IN" smtClean="0"/>
-              <a:t>19-09-2024</a:t>
+              <a:t>20-09-2024</a:t>
             </a:fld>
             <a:endParaRPr lang="en-IN"/>
           </a:p>

</xml_diff>